<commit_message>
Post meeting notes and updated deck
</commit_message>
<xml_diff>
--- a/MeetingNotes/2021-11-04 FEC - FECFile Online - Weekly Check-in.pptx
+++ b/MeetingNotes/2021-11-04 FEC - FECFile Online - Weekly Check-in.pptx
@@ -314,7 +314,7 @@
           <p:cNvPr id="2" name="Header Placeholder 1">
             <a:extLst>
               <a:ext uri="{FF2B5EF4-FFF2-40B4-BE49-F238E27FC236}">
-                <a16:creationId xmlns:a16="http://schemas.microsoft.com/office/drawing/2014/main" xmlns="" id="{DEE3DBA9-13E6-DC45-BDBA-98BB4BD2EFE3}"/>
+                <a16:creationId xmlns="" xmlns:a16="http://schemas.microsoft.com/office/drawing/2014/main" id="{DEE3DBA9-13E6-DC45-BDBA-98BB4BD2EFE3}"/>
               </a:ext>
             </a:extLst>
           </p:cNvPr>
@@ -351,7 +351,7 @@
           <p:cNvPr id="3" name="Date Placeholder 2">
             <a:extLst>
               <a:ext uri="{FF2B5EF4-FFF2-40B4-BE49-F238E27FC236}">
-                <a16:creationId xmlns:a16="http://schemas.microsoft.com/office/drawing/2014/main" xmlns="" id="{DB47A981-A150-F349-9F7E-0E8E0A0B9D07}"/>
+                <a16:creationId xmlns="" xmlns:a16="http://schemas.microsoft.com/office/drawing/2014/main" id="{DB47A981-A150-F349-9F7E-0E8E0A0B9D07}"/>
               </a:ext>
             </a:extLst>
           </p:cNvPr>
@@ -392,7 +392,7 @@
           <p:cNvPr id="4" name="Footer Placeholder 3">
             <a:extLst>
               <a:ext uri="{FF2B5EF4-FFF2-40B4-BE49-F238E27FC236}">
-                <a16:creationId xmlns:a16="http://schemas.microsoft.com/office/drawing/2014/main" xmlns="" id="{624D4072-1EDF-DE44-9B7B-0C0211BC80D3}"/>
+                <a16:creationId xmlns="" xmlns:a16="http://schemas.microsoft.com/office/drawing/2014/main" id="{624D4072-1EDF-DE44-9B7B-0C0211BC80D3}"/>
               </a:ext>
             </a:extLst>
           </p:cNvPr>
@@ -429,7 +429,7 @@
           <p:cNvPr id="5" name="Slide Number Placeholder 4">
             <a:extLst>
               <a:ext uri="{FF2B5EF4-FFF2-40B4-BE49-F238E27FC236}">
-                <a16:creationId xmlns:a16="http://schemas.microsoft.com/office/drawing/2014/main" xmlns="" id="{F0F3636E-DFDC-5C47-9485-3744BDD3CC23}"/>
+                <a16:creationId xmlns="" xmlns:a16="http://schemas.microsoft.com/office/drawing/2014/main" id="{F0F3636E-DFDC-5C47-9485-3744BDD3CC23}"/>
               </a:ext>
             </a:extLst>
           </p:cNvPr>
@@ -7252,15 +7252,7 @@
                   <a:schemeClr val="lt1"/>
                 </a:solidFill>
               </a:rPr>
-              <a:t>Nov 4</a:t>
-            </a:r>
-            <a:r>
-              <a:rPr lang="en-US" sz="2600" dirty="0" smtClean="0">
-                <a:solidFill>
-                  <a:schemeClr val="lt1"/>
-                </a:solidFill>
-              </a:rPr>
-              <a:t>, </a:t>
+              <a:t>Nov 4, </a:t>
             </a:r>
             <a:r>
               <a:rPr lang="en-US" sz="2600" dirty="0">
@@ -7478,24 +7470,12 @@
               <a:buChar char="•"/>
             </a:pPr>
             <a:r>
-              <a:rPr lang="en-US" dirty="0" smtClean="0"/>
-              <a:t>Open Feedback on QASP Evaluation</a:t>
+              <a:rPr lang="en-US" smtClean="0"/>
+              <a:t>Open </a:t>
             </a:r>
-          </a:p>
-          <a:p>
-            <a:pPr marL="350838" lvl="0" indent="-300038" algn="l" rtl="0">
-              <a:spcBef>
-                <a:spcPts val="0"/>
-              </a:spcBef>
-              <a:spcAft>
-                <a:spcPts val="600"/>
-              </a:spcAft>
-              <a:buSzPts val="2800"/>
-              <a:buChar char="•"/>
-            </a:pPr>
             <a:r>
               <a:rPr lang="en-US" dirty="0" smtClean="0"/>
-              <a:t>Open Discussion</a:t>
+              <a:t>Discussion</a:t>
             </a:r>
           </a:p>
           <a:p>
@@ -7613,56 +7593,56 @@
                 <a:gridCol w="2183446">
                   <a:extLst>
                     <a:ext uri="{9D8B030D-6E8A-4147-A177-3AD203B41FA5}">
-                      <a16:colId xmlns:a16="http://schemas.microsoft.com/office/drawing/2014/main" xmlns="" val="20000"/>
+                      <a16:colId xmlns="" xmlns:a16="http://schemas.microsoft.com/office/drawing/2014/main" val="20000"/>
                     </a:ext>
                   </a:extLst>
                 </a:gridCol>
                 <a:gridCol w="1207901">
                   <a:extLst>
                     <a:ext uri="{9D8B030D-6E8A-4147-A177-3AD203B41FA5}">
-                      <a16:colId xmlns:a16="http://schemas.microsoft.com/office/drawing/2014/main" xmlns="" val="20001"/>
+                      <a16:colId xmlns="" xmlns:a16="http://schemas.microsoft.com/office/drawing/2014/main" val="20001"/>
                     </a:ext>
                   </a:extLst>
                 </a:gridCol>
                 <a:gridCol w="1207901">
                   <a:extLst>
                     <a:ext uri="{9D8B030D-6E8A-4147-A177-3AD203B41FA5}">
-                      <a16:colId xmlns:a16="http://schemas.microsoft.com/office/drawing/2014/main" xmlns="" val="20002"/>
+                      <a16:colId xmlns="" xmlns:a16="http://schemas.microsoft.com/office/drawing/2014/main" val="20002"/>
                     </a:ext>
                   </a:extLst>
                 </a:gridCol>
                 <a:gridCol w="1207901">
                   <a:extLst>
                     <a:ext uri="{9D8B030D-6E8A-4147-A177-3AD203B41FA5}">
-                      <a16:colId xmlns:a16="http://schemas.microsoft.com/office/drawing/2014/main" xmlns="" val="20003"/>
+                      <a16:colId xmlns="" xmlns:a16="http://schemas.microsoft.com/office/drawing/2014/main" val="20003"/>
                     </a:ext>
                   </a:extLst>
                 </a:gridCol>
                 <a:gridCol w="1207901">
                   <a:extLst>
                     <a:ext uri="{9D8B030D-6E8A-4147-A177-3AD203B41FA5}">
-                      <a16:colId xmlns:a16="http://schemas.microsoft.com/office/drawing/2014/main" xmlns="" val="20004"/>
+                      <a16:colId xmlns="" xmlns:a16="http://schemas.microsoft.com/office/drawing/2014/main" val="20004"/>
                     </a:ext>
                   </a:extLst>
                 </a:gridCol>
                 <a:gridCol w="1207901">
                   <a:extLst>
                     <a:ext uri="{9D8B030D-6E8A-4147-A177-3AD203B41FA5}">
-                      <a16:colId xmlns:a16="http://schemas.microsoft.com/office/drawing/2014/main" xmlns="" val="20005"/>
+                      <a16:colId xmlns="" xmlns:a16="http://schemas.microsoft.com/office/drawing/2014/main" val="20005"/>
                     </a:ext>
                   </a:extLst>
                 </a:gridCol>
                 <a:gridCol w="1207901">
                   <a:extLst>
                     <a:ext uri="{9D8B030D-6E8A-4147-A177-3AD203B41FA5}">
-                      <a16:colId xmlns:a16="http://schemas.microsoft.com/office/drawing/2014/main" xmlns="" val="20006"/>
+                      <a16:colId xmlns="" xmlns:a16="http://schemas.microsoft.com/office/drawing/2014/main" val="20006"/>
                     </a:ext>
                   </a:extLst>
                 </a:gridCol>
                 <a:gridCol w="1207901">
                   <a:extLst>
                     <a:ext uri="{9D8B030D-6E8A-4147-A177-3AD203B41FA5}">
-                      <a16:colId xmlns:a16="http://schemas.microsoft.com/office/drawing/2014/main" xmlns="" val="20007"/>
+                      <a16:colId xmlns="" xmlns:a16="http://schemas.microsoft.com/office/drawing/2014/main" val="20007"/>
                     </a:ext>
                   </a:extLst>
                 </a:gridCol>
@@ -8251,7 +8231,7 @@
                 </a:tc>
                 <a:extLst>
                   <a:ext uri="{0D108BD9-81ED-4DB2-BD59-A6C34878D82A}">
-                    <a16:rowId xmlns:a16="http://schemas.microsoft.com/office/drawing/2014/main" xmlns="" val="10000"/>
+                    <a16:rowId xmlns="" xmlns:a16="http://schemas.microsoft.com/office/drawing/2014/main" val="10000"/>
                   </a:ext>
                 </a:extLst>
               </a:tr>
@@ -8828,7 +8808,7 @@
                 </a:tc>
                 <a:extLst>
                   <a:ext uri="{0D108BD9-81ED-4DB2-BD59-A6C34878D82A}">
-                    <a16:rowId xmlns:a16="http://schemas.microsoft.com/office/drawing/2014/main" xmlns="" val="10001"/>
+                    <a16:rowId xmlns="" xmlns:a16="http://schemas.microsoft.com/office/drawing/2014/main" val="10001"/>
                   </a:ext>
                 </a:extLst>
               </a:tr>
@@ -8863,7 +8843,7 @@
                 <a:gridCol w="3381300">
                   <a:extLst>
                     <a:ext uri="{9D8B030D-6E8A-4147-A177-3AD203B41FA5}">
-                      <a16:colId xmlns:a16="http://schemas.microsoft.com/office/drawing/2014/main" xmlns="" val="20000"/>
+                      <a16:colId xmlns="" xmlns:a16="http://schemas.microsoft.com/office/drawing/2014/main" val="20000"/>
                     </a:ext>
                   </a:extLst>
                 </a:gridCol>
@@ -8950,7 +8930,7 @@
                 </a:tc>
                 <a:extLst>
                   <a:ext uri="{0D108BD9-81ED-4DB2-BD59-A6C34878D82A}">
-                    <a16:rowId xmlns:a16="http://schemas.microsoft.com/office/drawing/2014/main" xmlns="" val="10000"/>
+                    <a16:rowId xmlns="" xmlns:a16="http://schemas.microsoft.com/office/drawing/2014/main" val="10000"/>
                   </a:ext>
                 </a:extLst>
               </a:tr>
@@ -9038,7 +9018,6 @@
                         <a:rPr lang="en-US" sz="1100" b="0" baseline="0" dirty="0" smtClean="0"/>
                         <a:t>Briefed preliminary reusability analysis findings to FEC</a:t>
                       </a:r>
-                      <a:endParaRPr lang="en-US" sz="1100" b="0" baseline="0" dirty="0" smtClean="0"/>
                     </a:p>
                   </a:txBody>
                   <a:tcPr marL="63500" marR="63500" marT="63500" marB="63500">
@@ -9082,7 +9061,7 @@
                 </a:tc>
                 <a:extLst>
                   <a:ext uri="{0D108BD9-81ED-4DB2-BD59-A6C34878D82A}">
-                    <a16:rowId xmlns:a16="http://schemas.microsoft.com/office/drawing/2014/main" xmlns="" val="10001"/>
+                    <a16:rowId xmlns="" xmlns:a16="http://schemas.microsoft.com/office/drawing/2014/main" val="10001"/>
                   </a:ext>
                 </a:extLst>
               </a:tr>
@@ -9117,7 +9096,7 @@
                 <a:gridCol w="3381300">
                   <a:extLst>
                     <a:ext uri="{9D8B030D-6E8A-4147-A177-3AD203B41FA5}">
-                      <a16:colId xmlns:a16="http://schemas.microsoft.com/office/drawing/2014/main" xmlns="" val="20000"/>
+                      <a16:colId xmlns="" xmlns:a16="http://schemas.microsoft.com/office/drawing/2014/main" val="20000"/>
                     </a:ext>
                   </a:extLst>
                 </a:gridCol>
@@ -9196,7 +9175,7 @@
                 </a:tc>
                 <a:extLst>
                   <a:ext uri="{0D108BD9-81ED-4DB2-BD59-A6C34878D82A}">
-                    <a16:rowId xmlns:a16="http://schemas.microsoft.com/office/drawing/2014/main" xmlns="" val="10000"/>
+                    <a16:rowId xmlns="" xmlns:a16="http://schemas.microsoft.com/office/drawing/2014/main" val="10000"/>
                   </a:ext>
                 </a:extLst>
               </a:tr>
@@ -9301,7 +9280,7 @@
                 </a:tc>
                 <a:extLst>
                   <a:ext uri="{0D108BD9-81ED-4DB2-BD59-A6C34878D82A}">
-                    <a16:rowId xmlns:a16="http://schemas.microsoft.com/office/drawing/2014/main" xmlns="" val="10001"/>
+                    <a16:rowId xmlns="" xmlns:a16="http://schemas.microsoft.com/office/drawing/2014/main" val="10001"/>
                   </a:ext>
                 </a:extLst>
               </a:tr>
@@ -9336,7 +9315,7 @@
                 <a:gridCol w="3381300">
                   <a:extLst>
                     <a:ext uri="{9D8B030D-6E8A-4147-A177-3AD203B41FA5}">
-                      <a16:colId xmlns:a16="http://schemas.microsoft.com/office/drawing/2014/main" xmlns="" val="20000"/>
+                      <a16:colId xmlns="" xmlns:a16="http://schemas.microsoft.com/office/drawing/2014/main" val="20000"/>
                     </a:ext>
                   </a:extLst>
                 </a:gridCol>
@@ -9415,7 +9394,7 @@
                 </a:tc>
                 <a:extLst>
                   <a:ext uri="{0D108BD9-81ED-4DB2-BD59-A6C34878D82A}">
-                    <a16:rowId xmlns:a16="http://schemas.microsoft.com/office/drawing/2014/main" xmlns="" val="10000"/>
+                    <a16:rowId xmlns="" xmlns:a16="http://schemas.microsoft.com/office/drawing/2014/main" val="10000"/>
                   </a:ext>
                 </a:extLst>
               </a:tr>
@@ -9485,7 +9464,7 @@
                 </a:tc>
                 <a:extLst>
                   <a:ext uri="{0D108BD9-81ED-4DB2-BD59-A6C34878D82A}">
-                    <a16:rowId xmlns:a16="http://schemas.microsoft.com/office/drawing/2014/main" xmlns="" val="10001"/>
+                    <a16:rowId xmlns="" xmlns:a16="http://schemas.microsoft.com/office/drawing/2014/main" val="10001"/>
                   </a:ext>
                 </a:extLst>
               </a:tr>
@@ -9599,56 +9578,56 @@
                 <a:gridCol w="2183446">
                   <a:extLst>
                     <a:ext uri="{9D8B030D-6E8A-4147-A177-3AD203B41FA5}">
-                      <a16:colId xmlns:a16="http://schemas.microsoft.com/office/drawing/2014/main" xmlns="" val="20000"/>
+                      <a16:colId xmlns="" xmlns:a16="http://schemas.microsoft.com/office/drawing/2014/main" val="20000"/>
                     </a:ext>
                   </a:extLst>
                 </a:gridCol>
                 <a:gridCol w="1207901">
                   <a:extLst>
                     <a:ext uri="{9D8B030D-6E8A-4147-A177-3AD203B41FA5}">
-                      <a16:colId xmlns:a16="http://schemas.microsoft.com/office/drawing/2014/main" xmlns="" val="20001"/>
+                      <a16:colId xmlns="" xmlns:a16="http://schemas.microsoft.com/office/drawing/2014/main" val="20001"/>
                     </a:ext>
                   </a:extLst>
                 </a:gridCol>
                 <a:gridCol w="1207901">
                   <a:extLst>
                     <a:ext uri="{9D8B030D-6E8A-4147-A177-3AD203B41FA5}">
-                      <a16:colId xmlns:a16="http://schemas.microsoft.com/office/drawing/2014/main" xmlns="" val="20002"/>
+                      <a16:colId xmlns="" xmlns:a16="http://schemas.microsoft.com/office/drawing/2014/main" val="20002"/>
                     </a:ext>
                   </a:extLst>
                 </a:gridCol>
                 <a:gridCol w="1207901">
                   <a:extLst>
                     <a:ext uri="{9D8B030D-6E8A-4147-A177-3AD203B41FA5}">
-                      <a16:colId xmlns:a16="http://schemas.microsoft.com/office/drawing/2014/main" xmlns="" val="20003"/>
+                      <a16:colId xmlns="" xmlns:a16="http://schemas.microsoft.com/office/drawing/2014/main" val="20003"/>
                     </a:ext>
                   </a:extLst>
                 </a:gridCol>
                 <a:gridCol w="1207901">
                   <a:extLst>
                     <a:ext uri="{9D8B030D-6E8A-4147-A177-3AD203B41FA5}">
-                      <a16:colId xmlns:a16="http://schemas.microsoft.com/office/drawing/2014/main" xmlns="" val="20004"/>
+                      <a16:colId xmlns="" xmlns:a16="http://schemas.microsoft.com/office/drawing/2014/main" val="20004"/>
                     </a:ext>
                   </a:extLst>
                 </a:gridCol>
                 <a:gridCol w="1207901">
                   <a:extLst>
                     <a:ext uri="{9D8B030D-6E8A-4147-A177-3AD203B41FA5}">
-                      <a16:colId xmlns:a16="http://schemas.microsoft.com/office/drawing/2014/main" xmlns="" val="20005"/>
+                      <a16:colId xmlns="" xmlns:a16="http://schemas.microsoft.com/office/drawing/2014/main" val="20005"/>
                     </a:ext>
                   </a:extLst>
                 </a:gridCol>
                 <a:gridCol w="1207901">
                   <a:extLst>
                     <a:ext uri="{9D8B030D-6E8A-4147-A177-3AD203B41FA5}">
-                      <a16:colId xmlns:a16="http://schemas.microsoft.com/office/drawing/2014/main" xmlns="" val="20006"/>
+                      <a16:colId xmlns="" xmlns:a16="http://schemas.microsoft.com/office/drawing/2014/main" val="20006"/>
                     </a:ext>
                   </a:extLst>
                 </a:gridCol>
                 <a:gridCol w="1207901">
                   <a:extLst>
                     <a:ext uri="{9D8B030D-6E8A-4147-A177-3AD203B41FA5}">
-                      <a16:colId xmlns:a16="http://schemas.microsoft.com/office/drawing/2014/main" xmlns="" val="20007"/>
+                      <a16:colId xmlns="" xmlns:a16="http://schemas.microsoft.com/office/drawing/2014/main" val="20007"/>
                     </a:ext>
                   </a:extLst>
                 </a:gridCol>
@@ -10237,7 +10216,7 @@
                 </a:tc>
                 <a:extLst>
                   <a:ext uri="{0D108BD9-81ED-4DB2-BD59-A6C34878D82A}">
-                    <a16:rowId xmlns:a16="http://schemas.microsoft.com/office/drawing/2014/main" xmlns="" val="10000"/>
+                    <a16:rowId xmlns="" xmlns:a16="http://schemas.microsoft.com/office/drawing/2014/main" val="10000"/>
                   </a:ext>
                 </a:extLst>
               </a:tr>
@@ -10814,7 +10793,7 @@
                 </a:tc>
                 <a:extLst>
                   <a:ext uri="{0D108BD9-81ED-4DB2-BD59-A6C34878D82A}">
-                    <a16:rowId xmlns:a16="http://schemas.microsoft.com/office/drawing/2014/main" xmlns="" val="10001"/>
+                    <a16:rowId xmlns="" xmlns:a16="http://schemas.microsoft.com/office/drawing/2014/main" val="10001"/>
                   </a:ext>
                 </a:extLst>
               </a:tr>
@@ -10849,7 +10828,7 @@
                 <a:gridCol w="3381300">
                   <a:extLst>
                     <a:ext uri="{9D8B030D-6E8A-4147-A177-3AD203B41FA5}">
-                      <a16:colId xmlns:a16="http://schemas.microsoft.com/office/drawing/2014/main" xmlns="" val="20000"/>
+                      <a16:colId xmlns="" xmlns:a16="http://schemas.microsoft.com/office/drawing/2014/main" val="20000"/>
                     </a:ext>
                   </a:extLst>
                 </a:gridCol>
@@ -10936,7 +10915,7 @@
                 </a:tc>
                 <a:extLst>
                   <a:ext uri="{0D108BD9-81ED-4DB2-BD59-A6C34878D82A}">
-                    <a16:rowId xmlns:a16="http://schemas.microsoft.com/office/drawing/2014/main" xmlns="" val="10000"/>
+                    <a16:rowId xmlns="" xmlns:a16="http://schemas.microsoft.com/office/drawing/2014/main" val="10000"/>
                   </a:ext>
                 </a:extLst>
               </a:tr>
@@ -10962,7 +10941,6 @@
                         <a:rPr lang="en-US" sz="1100" baseline="0" dirty="0" smtClean="0"/>
                         <a:t>Received acceptance on one position (Scrum Master); awaiting confirmation on second position (BA/Product Manager)</a:t>
                       </a:r>
-                      <a:endParaRPr lang="en-US" sz="1100" baseline="0" dirty="0" smtClean="0"/>
                     </a:p>
                     <a:p>
                       <a:pPr marL="115888" lvl="0" indent="-115888" algn="l" rtl="0">
@@ -11183,7 +11161,7 @@
                 </a:tc>
                 <a:extLst>
                   <a:ext uri="{0D108BD9-81ED-4DB2-BD59-A6C34878D82A}">
-                    <a16:rowId xmlns:a16="http://schemas.microsoft.com/office/drawing/2014/main" xmlns="" val="10001"/>
+                    <a16:rowId xmlns="" xmlns:a16="http://schemas.microsoft.com/office/drawing/2014/main" val="10001"/>
                   </a:ext>
                 </a:extLst>
               </a:tr>
@@ -11218,7 +11196,7 @@
                 <a:gridCol w="3381300">
                   <a:extLst>
                     <a:ext uri="{9D8B030D-6E8A-4147-A177-3AD203B41FA5}">
-                      <a16:colId xmlns:a16="http://schemas.microsoft.com/office/drawing/2014/main" xmlns="" val="20000"/>
+                      <a16:colId xmlns="" xmlns:a16="http://schemas.microsoft.com/office/drawing/2014/main" val="20000"/>
                     </a:ext>
                   </a:extLst>
                 </a:gridCol>
@@ -11297,7 +11275,7 @@
                 </a:tc>
                 <a:extLst>
                   <a:ext uri="{0D108BD9-81ED-4DB2-BD59-A6C34878D82A}">
-                    <a16:rowId xmlns:a16="http://schemas.microsoft.com/office/drawing/2014/main" xmlns="" val="10000"/>
+                    <a16:rowId xmlns="" xmlns:a16="http://schemas.microsoft.com/office/drawing/2014/main" val="10000"/>
                   </a:ext>
                 </a:extLst>
               </a:tr>
@@ -11339,15 +11317,7 @@
                       </a:pPr>
                       <a:r>
                         <a:rPr lang="en-US" sz="1100" baseline="0" dirty="0" smtClean="0"/>
-                        <a:t>Continue </a:t>
-                      </a:r>
-                      <a:r>
-                        <a:rPr lang="en-US" sz="1100" baseline="0" dirty="0" smtClean="0"/>
-                        <a:t>staffing efforts for Option Period 1 </a:t>
-                      </a:r>
-                      <a:r>
-                        <a:rPr lang="en-US" sz="1100" baseline="0" dirty="0" smtClean="0"/>
-                        <a:t>team</a:t>
+                        <a:t>Continue staffing efforts for Option Period 1 team</a:t>
                       </a:r>
                     </a:p>
                     <a:p>
@@ -11433,7 +11403,7 @@
                 </a:tc>
                 <a:extLst>
                   <a:ext uri="{0D108BD9-81ED-4DB2-BD59-A6C34878D82A}">
-                    <a16:rowId xmlns:a16="http://schemas.microsoft.com/office/drawing/2014/main" xmlns="" val="10001"/>
+                    <a16:rowId xmlns="" xmlns:a16="http://schemas.microsoft.com/office/drawing/2014/main" val="10001"/>
                   </a:ext>
                 </a:extLst>
               </a:tr>
@@ -11468,7 +11438,7 @@
                 <a:gridCol w="3381300">
                   <a:extLst>
                     <a:ext uri="{9D8B030D-6E8A-4147-A177-3AD203B41FA5}">
-                      <a16:colId xmlns:a16="http://schemas.microsoft.com/office/drawing/2014/main" xmlns="" val="20000"/>
+                      <a16:colId xmlns="" xmlns:a16="http://schemas.microsoft.com/office/drawing/2014/main" val="20000"/>
                     </a:ext>
                   </a:extLst>
                 </a:gridCol>
@@ -11547,7 +11517,7 @@
                 </a:tc>
                 <a:extLst>
                   <a:ext uri="{0D108BD9-81ED-4DB2-BD59-A6C34878D82A}">
-                    <a16:rowId xmlns:a16="http://schemas.microsoft.com/office/drawing/2014/main" xmlns="" val="10000"/>
+                    <a16:rowId xmlns="" xmlns:a16="http://schemas.microsoft.com/office/drawing/2014/main" val="10000"/>
                   </a:ext>
                 </a:extLst>
               </a:tr>
@@ -11651,7 +11621,7 @@
                 </a:tc>
                 <a:extLst>
                   <a:ext uri="{0D108BD9-81ED-4DB2-BD59-A6C34878D82A}">
-                    <a16:rowId xmlns:a16="http://schemas.microsoft.com/office/drawing/2014/main" xmlns="" val="10001"/>
+                    <a16:rowId xmlns="" xmlns:a16="http://schemas.microsoft.com/office/drawing/2014/main" val="10001"/>
                   </a:ext>
                 </a:extLst>
               </a:tr>
@@ -11765,56 +11735,56 @@
                 <a:gridCol w="2173603">
                   <a:extLst>
                     <a:ext uri="{9D8B030D-6E8A-4147-A177-3AD203B41FA5}">
-                      <a16:colId xmlns:a16="http://schemas.microsoft.com/office/drawing/2014/main" xmlns="" val="20000"/>
+                      <a16:colId xmlns="" xmlns:a16="http://schemas.microsoft.com/office/drawing/2014/main" val="20000"/>
                     </a:ext>
                   </a:extLst>
                 </a:gridCol>
                 <a:gridCol w="1202455">
                   <a:extLst>
                     <a:ext uri="{9D8B030D-6E8A-4147-A177-3AD203B41FA5}">
-                      <a16:colId xmlns:a16="http://schemas.microsoft.com/office/drawing/2014/main" xmlns="" val="20001"/>
+                      <a16:colId xmlns="" xmlns:a16="http://schemas.microsoft.com/office/drawing/2014/main" val="20001"/>
                     </a:ext>
                   </a:extLst>
                 </a:gridCol>
                 <a:gridCol w="1202455">
                   <a:extLst>
                     <a:ext uri="{9D8B030D-6E8A-4147-A177-3AD203B41FA5}">
-                      <a16:colId xmlns:a16="http://schemas.microsoft.com/office/drawing/2014/main" xmlns="" val="20002"/>
+                      <a16:colId xmlns="" xmlns:a16="http://schemas.microsoft.com/office/drawing/2014/main" val="20002"/>
                     </a:ext>
                   </a:extLst>
                 </a:gridCol>
                 <a:gridCol w="1202455">
                   <a:extLst>
                     <a:ext uri="{9D8B030D-6E8A-4147-A177-3AD203B41FA5}">
-                      <a16:colId xmlns:a16="http://schemas.microsoft.com/office/drawing/2014/main" xmlns="" val="20003"/>
+                      <a16:colId xmlns="" xmlns:a16="http://schemas.microsoft.com/office/drawing/2014/main" val="20003"/>
                     </a:ext>
                   </a:extLst>
                 </a:gridCol>
                 <a:gridCol w="1202455">
                   <a:extLst>
                     <a:ext uri="{9D8B030D-6E8A-4147-A177-3AD203B41FA5}">
-                      <a16:colId xmlns:a16="http://schemas.microsoft.com/office/drawing/2014/main" xmlns="" val="20004"/>
+                      <a16:colId xmlns="" xmlns:a16="http://schemas.microsoft.com/office/drawing/2014/main" val="20004"/>
                     </a:ext>
                   </a:extLst>
                 </a:gridCol>
                 <a:gridCol w="1202455">
                   <a:extLst>
                     <a:ext uri="{9D8B030D-6E8A-4147-A177-3AD203B41FA5}">
-                      <a16:colId xmlns:a16="http://schemas.microsoft.com/office/drawing/2014/main" xmlns="" val="20005"/>
+                      <a16:colId xmlns="" xmlns:a16="http://schemas.microsoft.com/office/drawing/2014/main" val="20005"/>
                     </a:ext>
                   </a:extLst>
                 </a:gridCol>
                 <a:gridCol w="1202455">
                   <a:extLst>
                     <a:ext uri="{9D8B030D-6E8A-4147-A177-3AD203B41FA5}">
-                      <a16:colId xmlns:a16="http://schemas.microsoft.com/office/drawing/2014/main" xmlns="" val="20006"/>
+                      <a16:colId xmlns="" xmlns:a16="http://schemas.microsoft.com/office/drawing/2014/main" val="20006"/>
                     </a:ext>
                   </a:extLst>
                 </a:gridCol>
                 <a:gridCol w="1202455">
                   <a:extLst>
                     <a:ext uri="{9D8B030D-6E8A-4147-A177-3AD203B41FA5}">
-                      <a16:colId xmlns:a16="http://schemas.microsoft.com/office/drawing/2014/main" xmlns="" val="20007"/>
+                      <a16:colId xmlns="" xmlns:a16="http://schemas.microsoft.com/office/drawing/2014/main" val="20007"/>
                     </a:ext>
                   </a:extLst>
                 </a:gridCol>
@@ -12403,7 +12373,7 @@
                 </a:tc>
                 <a:extLst>
                   <a:ext uri="{0D108BD9-81ED-4DB2-BD59-A6C34878D82A}">
-                    <a16:rowId xmlns:a16="http://schemas.microsoft.com/office/drawing/2014/main" xmlns="" val="10000"/>
+                    <a16:rowId xmlns="" xmlns:a16="http://schemas.microsoft.com/office/drawing/2014/main" val="10000"/>
                   </a:ext>
                 </a:extLst>
               </a:tr>
@@ -13007,7 +12977,7 @@
                 </a:tc>
                 <a:extLst>
                   <a:ext uri="{0D108BD9-81ED-4DB2-BD59-A6C34878D82A}">
-                    <a16:rowId xmlns:a16="http://schemas.microsoft.com/office/drawing/2014/main" xmlns="" val="10001"/>
+                    <a16:rowId xmlns="" xmlns:a16="http://schemas.microsoft.com/office/drawing/2014/main" val="10001"/>
                   </a:ext>
                 </a:extLst>
               </a:tr>
@@ -13042,7 +13012,7 @@
                 <a:gridCol w="3381300">
                   <a:extLst>
                     <a:ext uri="{9D8B030D-6E8A-4147-A177-3AD203B41FA5}">
-                      <a16:colId xmlns:a16="http://schemas.microsoft.com/office/drawing/2014/main" xmlns="" val="20000"/>
+                      <a16:colId xmlns="" xmlns:a16="http://schemas.microsoft.com/office/drawing/2014/main" val="20000"/>
                     </a:ext>
                   </a:extLst>
                 </a:gridCol>
@@ -13129,7 +13099,7 @@
                 </a:tc>
                 <a:extLst>
                   <a:ext uri="{0D108BD9-81ED-4DB2-BD59-A6C34878D82A}">
-                    <a16:rowId xmlns:a16="http://schemas.microsoft.com/office/drawing/2014/main" xmlns="" val="10000"/>
+                    <a16:rowId xmlns="" xmlns:a16="http://schemas.microsoft.com/office/drawing/2014/main" val="10000"/>
                   </a:ext>
                 </a:extLst>
               </a:tr>
@@ -13153,17 +13123,8 @@
                       </a:pPr>
                       <a:r>
                         <a:rPr lang="en-US" sz="1100" baseline="0" dirty="0" smtClean="0"/>
-                        <a:t>Received TCG approval for </a:t>
+                        <a:t>Received TCG approval for rate schedule for option period </a:t>
                       </a:r>
-                      <a:r>
-                        <a:rPr lang="en-US" sz="1100" baseline="0" dirty="0" smtClean="0"/>
-                        <a:t>rate schedule for option </a:t>
-                      </a:r>
-                      <a:r>
-                        <a:rPr lang="en-US" sz="1100" baseline="0" dirty="0" smtClean="0"/>
-                        <a:t>period </a:t>
-                      </a:r>
-                      <a:endParaRPr lang="en-US" sz="1100" baseline="0" dirty="0" smtClean="0"/>
                     </a:p>
                   </a:txBody>
                   <a:tcPr marL="63500" marR="63500" marT="63500" marB="63500">
@@ -13207,7 +13168,7 @@
                 </a:tc>
                 <a:extLst>
                   <a:ext uri="{0D108BD9-81ED-4DB2-BD59-A6C34878D82A}">
-                    <a16:rowId xmlns:a16="http://schemas.microsoft.com/office/drawing/2014/main" xmlns="" val="10001"/>
+                    <a16:rowId xmlns="" xmlns:a16="http://schemas.microsoft.com/office/drawing/2014/main" val="10001"/>
                   </a:ext>
                 </a:extLst>
               </a:tr>
@@ -13242,7 +13203,7 @@
                 <a:gridCol w="3381300">
                   <a:extLst>
                     <a:ext uri="{9D8B030D-6E8A-4147-A177-3AD203B41FA5}">
-                      <a16:colId xmlns:a16="http://schemas.microsoft.com/office/drawing/2014/main" xmlns="" val="20000"/>
+                      <a16:colId xmlns="" xmlns:a16="http://schemas.microsoft.com/office/drawing/2014/main" val="20000"/>
                     </a:ext>
                   </a:extLst>
                 </a:gridCol>
@@ -13321,7 +13282,7 @@
                 </a:tc>
                 <a:extLst>
                   <a:ext uri="{0D108BD9-81ED-4DB2-BD59-A6C34878D82A}">
-                    <a16:rowId xmlns:a16="http://schemas.microsoft.com/office/drawing/2014/main" xmlns="" val="10000"/>
+                    <a16:rowId xmlns="" xmlns:a16="http://schemas.microsoft.com/office/drawing/2014/main" val="10000"/>
                   </a:ext>
                 </a:extLst>
               </a:tr>
@@ -13349,11 +13310,7 @@
                       </a:r>
                       <a:r>
                         <a:rPr lang="en-US" sz="1100" baseline="0" dirty="0" smtClean="0"/>
-                        <a:t> submit supporting materials (e.g. rates/labor </a:t>
-                      </a:r>
-                      <a:r>
-                        <a:rPr lang="en-US" sz="1100" baseline="0" dirty="0" smtClean="0"/>
-                        <a:t>categories and </a:t>
+                        <a:t> submit supporting materials (e.g. rates/labor categories and </a:t>
                       </a:r>
                       <a:r>
                         <a:rPr lang="en-US" sz="1100" baseline="0" dirty="0" err="1" smtClean="0"/>
@@ -13407,7 +13364,7 @@
                 </a:tc>
                 <a:extLst>
                   <a:ext uri="{0D108BD9-81ED-4DB2-BD59-A6C34878D82A}">
-                    <a16:rowId xmlns:a16="http://schemas.microsoft.com/office/drawing/2014/main" xmlns="" val="10001"/>
+                    <a16:rowId xmlns="" xmlns:a16="http://schemas.microsoft.com/office/drawing/2014/main" val="10001"/>
                   </a:ext>
                 </a:extLst>
               </a:tr>
@@ -13442,7 +13399,7 @@
                 <a:gridCol w="3381300">
                   <a:extLst>
                     <a:ext uri="{9D8B030D-6E8A-4147-A177-3AD203B41FA5}">
-                      <a16:colId xmlns:a16="http://schemas.microsoft.com/office/drawing/2014/main" xmlns="" val="20000"/>
+                      <a16:colId xmlns="" xmlns:a16="http://schemas.microsoft.com/office/drawing/2014/main" val="20000"/>
                     </a:ext>
                   </a:extLst>
                 </a:gridCol>
@@ -13521,7 +13478,7 @@
                 </a:tc>
                 <a:extLst>
                   <a:ext uri="{0D108BD9-81ED-4DB2-BD59-A6C34878D82A}">
-                    <a16:rowId xmlns:a16="http://schemas.microsoft.com/office/drawing/2014/main" xmlns="" val="10000"/>
+                    <a16:rowId xmlns="" xmlns:a16="http://schemas.microsoft.com/office/drawing/2014/main" val="10000"/>
                   </a:ext>
                 </a:extLst>
               </a:tr>
@@ -13547,7 +13504,6 @@
                         <a:rPr lang="en-US" sz="1100" baseline="0" dirty="0" smtClean="0"/>
                         <a:t>Discuss team composition and staffing? </a:t>
                       </a:r>
-                      <a:endParaRPr lang="en-US" sz="1100" baseline="0" dirty="0" smtClean="0"/>
                     </a:p>
                     <a:p>
                       <a:pPr marL="171450" lvl="0" indent="-171450" algn="l" rtl="0">
@@ -13621,7 +13577,7 @@
                 </a:tc>
                 <a:extLst>
                   <a:ext uri="{0D108BD9-81ED-4DB2-BD59-A6C34878D82A}">
-                    <a16:rowId xmlns:a16="http://schemas.microsoft.com/office/drawing/2014/main" xmlns="" val="10001"/>
+                    <a16:rowId xmlns="" xmlns:a16="http://schemas.microsoft.com/office/drawing/2014/main" val="10001"/>
                   </a:ext>
                 </a:extLst>
               </a:tr>
@@ -13739,42 +13695,42 @@
                 <a:gridCol w="2623482">
                   <a:extLst>
                     <a:ext uri="{9D8B030D-6E8A-4147-A177-3AD203B41FA5}">
-                      <a16:colId xmlns:a16="http://schemas.microsoft.com/office/drawing/2014/main" xmlns="" val="20000"/>
+                      <a16:colId xmlns="" xmlns:a16="http://schemas.microsoft.com/office/drawing/2014/main" val="20000"/>
                     </a:ext>
                   </a:extLst>
                 </a:gridCol>
                 <a:gridCol w="813627">
                   <a:extLst>
                     <a:ext uri="{9D8B030D-6E8A-4147-A177-3AD203B41FA5}">
-                      <a16:colId xmlns:a16="http://schemas.microsoft.com/office/drawing/2014/main" xmlns="" val="20001"/>
+                      <a16:colId xmlns="" xmlns:a16="http://schemas.microsoft.com/office/drawing/2014/main" val="20001"/>
                     </a:ext>
                   </a:extLst>
                 </a:gridCol>
                 <a:gridCol w="1348902">
                   <a:extLst>
                     <a:ext uri="{9D8B030D-6E8A-4147-A177-3AD203B41FA5}">
-                      <a16:colId xmlns:a16="http://schemas.microsoft.com/office/drawing/2014/main" xmlns="" val="20002"/>
+                      <a16:colId xmlns="" xmlns:a16="http://schemas.microsoft.com/office/drawing/2014/main" val="20002"/>
                     </a:ext>
                   </a:extLst>
                 </a:gridCol>
                 <a:gridCol w="1167319">
                   <a:extLst>
                     <a:ext uri="{9D8B030D-6E8A-4147-A177-3AD203B41FA5}">
-                      <a16:colId xmlns:a16="http://schemas.microsoft.com/office/drawing/2014/main" xmlns="" val="20003"/>
+                      <a16:colId xmlns="" xmlns:a16="http://schemas.microsoft.com/office/drawing/2014/main" val="20003"/>
                     </a:ext>
                   </a:extLst>
                 </a:gridCol>
                 <a:gridCol w="3891064">
                   <a:extLst>
                     <a:ext uri="{9D8B030D-6E8A-4147-A177-3AD203B41FA5}">
-                      <a16:colId xmlns:a16="http://schemas.microsoft.com/office/drawing/2014/main" xmlns="" val="20004"/>
+                      <a16:colId xmlns="" xmlns:a16="http://schemas.microsoft.com/office/drawing/2014/main" val="20004"/>
                     </a:ext>
                   </a:extLst>
                 </a:gridCol>
                 <a:gridCol w="1348901">
                   <a:extLst>
                     <a:ext uri="{9D8B030D-6E8A-4147-A177-3AD203B41FA5}">
-                      <a16:colId xmlns:a16="http://schemas.microsoft.com/office/drawing/2014/main" xmlns="" val="20005"/>
+                      <a16:colId xmlns="" xmlns:a16="http://schemas.microsoft.com/office/drawing/2014/main" val="20005"/>
                     </a:ext>
                   </a:extLst>
                 </a:gridCol>
@@ -14234,7 +14190,7 @@
                 </a:tc>
                 <a:extLst>
                   <a:ext uri="{0D108BD9-81ED-4DB2-BD59-A6C34878D82A}">
-                    <a16:rowId xmlns:a16="http://schemas.microsoft.com/office/drawing/2014/main" xmlns="" val="10000"/>
+                    <a16:rowId xmlns="" xmlns:a16="http://schemas.microsoft.com/office/drawing/2014/main" val="10000"/>
                   </a:ext>
                 </a:extLst>
               </a:tr>
@@ -14677,7 +14633,7 @@
                 </a:tc>
                 <a:extLst>
                   <a:ext uri="{0D108BD9-81ED-4DB2-BD59-A6C34878D82A}">
-                    <a16:rowId xmlns:a16="http://schemas.microsoft.com/office/drawing/2014/main" xmlns="" val="10001"/>
+                    <a16:rowId xmlns="" xmlns:a16="http://schemas.microsoft.com/office/drawing/2014/main" val="10001"/>
                   </a:ext>
                 </a:extLst>
               </a:tr>
@@ -15040,7 +14996,7 @@
                 </a:tc>
                 <a:extLst>
                   <a:ext uri="{0D108BD9-81ED-4DB2-BD59-A6C34878D82A}">
-                    <a16:rowId xmlns:a16="http://schemas.microsoft.com/office/drawing/2014/main" xmlns="" val="10003"/>
+                    <a16:rowId xmlns="" xmlns:a16="http://schemas.microsoft.com/office/drawing/2014/main" val="10003"/>
                   </a:ext>
                 </a:extLst>
               </a:tr>
@@ -15403,7 +15359,7 @@
                 </a:tc>
                 <a:extLst>
                   <a:ext uri="{0D108BD9-81ED-4DB2-BD59-A6C34878D82A}">
-                    <a16:rowId xmlns:a16="http://schemas.microsoft.com/office/drawing/2014/main" xmlns="" val="3646535492"/>
+                    <a16:rowId xmlns="" xmlns:a16="http://schemas.microsoft.com/office/drawing/2014/main" val="3646535492"/>
                   </a:ext>
                 </a:extLst>
               </a:tr>
@@ -15766,7 +15722,7 @@
                 </a:tc>
                 <a:extLst>
                   <a:ext uri="{0D108BD9-81ED-4DB2-BD59-A6C34878D82A}">
-                    <a16:rowId xmlns:a16="http://schemas.microsoft.com/office/drawing/2014/main" xmlns="" val="376521511"/>
+                    <a16:rowId xmlns="" xmlns:a16="http://schemas.microsoft.com/office/drawing/2014/main" val="376521511"/>
                   </a:ext>
                 </a:extLst>
               </a:tr>
@@ -15964,28 +15920,28 @@
                 <a:gridCol w="1052956">
                   <a:extLst>
                     <a:ext uri="{9D8B030D-6E8A-4147-A177-3AD203B41FA5}">
-                      <a16:colId xmlns:a16="http://schemas.microsoft.com/office/drawing/2014/main" xmlns="" val="20000"/>
+                      <a16:colId xmlns="" xmlns:a16="http://schemas.microsoft.com/office/drawing/2014/main" val="20000"/>
                     </a:ext>
                   </a:extLst>
                 </a:gridCol>
                 <a:gridCol w="3114471">
                   <a:extLst>
                     <a:ext uri="{9D8B030D-6E8A-4147-A177-3AD203B41FA5}">
-                      <a16:colId xmlns:a16="http://schemas.microsoft.com/office/drawing/2014/main" xmlns="" val="20001"/>
+                      <a16:colId xmlns="" xmlns:a16="http://schemas.microsoft.com/office/drawing/2014/main" val="20001"/>
                     </a:ext>
                   </a:extLst>
                 </a:gridCol>
                 <a:gridCol w="3114471">
                   <a:extLst>
                     <a:ext uri="{9D8B030D-6E8A-4147-A177-3AD203B41FA5}">
-                      <a16:colId xmlns:a16="http://schemas.microsoft.com/office/drawing/2014/main" xmlns="" val="20002"/>
+                      <a16:colId xmlns="" xmlns:a16="http://schemas.microsoft.com/office/drawing/2014/main" val="20002"/>
                     </a:ext>
                   </a:extLst>
                 </a:gridCol>
                 <a:gridCol w="3114471">
                   <a:extLst>
                     <a:ext uri="{9D8B030D-6E8A-4147-A177-3AD203B41FA5}">
-                      <a16:colId xmlns:a16="http://schemas.microsoft.com/office/drawing/2014/main" xmlns="" val="20003"/>
+                      <a16:colId xmlns="" xmlns:a16="http://schemas.microsoft.com/office/drawing/2014/main" val="20003"/>
                     </a:ext>
                   </a:extLst>
                 </a:gridCol>
@@ -16282,7 +16238,7 @@
                 </a:tc>
                 <a:extLst>
                   <a:ext uri="{0D108BD9-81ED-4DB2-BD59-A6C34878D82A}">
-                    <a16:rowId xmlns:a16="http://schemas.microsoft.com/office/drawing/2014/main" xmlns="" val="10000"/>
+                    <a16:rowId xmlns="" xmlns:a16="http://schemas.microsoft.com/office/drawing/2014/main" val="10000"/>
                   </a:ext>
                 </a:extLst>
               </a:tr>
@@ -16544,7 +16500,7 @@
                 </a:tc>
                 <a:extLst>
                   <a:ext uri="{0D108BD9-81ED-4DB2-BD59-A6C34878D82A}">
-                    <a16:rowId xmlns:a16="http://schemas.microsoft.com/office/drawing/2014/main" xmlns="" val="10001"/>
+                    <a16:rowId xmlns="" xmlns:a16="http://schemas.microsoft.com/office/drawing/2014/main" val="10001"/>
                   </a:ext>
                 </a:extLst>
               </a:tr>
@@ -17214,7 +17170,7 @@
                 </a:tc>
                 <a:extLst>
                   <a:ext uri="{0D108BD9-81ED-4DB2-BD59-A6C34878D82A}">
-                    <a16:rowId xmlns:a16="http://schemas.microsoft.com/office/drawing/2014/main" xmlns="" val="10002"/>
+                    <a16:rowId xmlns="" xmlns:a16="http://schemas.microsoft.com/office/drawing/2014/main" val="10002"/>
                   </a:ext>
                 </a:extLst>
               </a:tr>
@@ -17488,7 +17444,7 @@
                 </a:tc>
                 <a:extLst>
                   <a:ext uri="{0D108BD9-81ED-4DB2-BD59-A6C34878D82A}">
-                    <a16:rowId xmlns:a16="http://schemas.microsoft.com/office/drawing/2014/main" xmlns="" val="10003"/>
+                    <a16:rowId xmlns="" xmlns:a16="http://schemas.microsoft.com/office/drawing/2014/main" val="10003"/>
                   </a:ext>
                 </a:extLst>
               </a:tr>

</xml_diff>